<commit_message>
atividade de informatica atualizada
</commit_message>
<xml_diff>
--- a/atividade_apr_eletronicas/Funções de String no Excel.pptx
+++ b/atividade_apr_eletronicas/Funções de String no Excel.pptx
@@ -15623,7 +15623,7 @@
         </p:nvSpPr>
         <p:spPr>
           <a:xfrm>
-            <a:off x="796772" y="1732280"/>
+            <a:off x="838200" y="1348740"/>
             <a:ext cx="7175500" cy="4160520"/>
           </a:xfrm>
         </p:spPr>
@@ -15633,14 +15633,12 @@
           </a:bodyPr>
           <a:lstStyle/>
           <a:p>
-            <a:pPr algn="just"/>
             <a:r>
               <a:rPr lang="pt-BR" dirty="0"/>
-              <a:t>O Microsoft Excel</a:t>
+              <a:t> Microsoft Excel é um editor de planilhas com muitas funcionalidades</a:t>
             </a:r>
           </a:p>
           <a:p>
-            <a:pPr algn="just"/>
             <a:r>
               <a:rPr lang="pt-BR" dirty="0"/>
               <a:t>Funções de String = funções de </a:t>
@@ -15688,7 +15686,7 @@
         </p:blipFill>
         <p:spPr>
           <a:xfrm>
-            <a:off x="7666848" y="2679700"/>
+            <a:off x="7834611" y="2679700"/>
             <a:ext cx="4357389" cy="3472180"/>
           </a:xfrm>
           <a:custGeom>

</xml_diff>